<commit_message>
fix issue #9, update image for accessibility
</commit_message>
<xml_diff>
--- a/Whiteboard design session/WDS trainer presentation - Microservices architecture.pptx
+++ b/Whiteboard design session/WDS trainer presentation - Microservices architecture.pptx
@@ -229,7 +229,7 @@
           <a:p>
             <a:fld id="{52A13B17-C506-4D51-BB37-16B365906619}" type="datetimeFigureOut">
               <a:rPr lang="en-US" smtClean="0"/>
-              <a:t>6/29/2018</a:t>
+              <a:t>7/2/2018</a:t>
             </a:fld>
             <a:endParaRPr lang="en-US" dirty="0"/>
           </a:p>
@@ -5693,7 +5693,7 @@
                   <a:prstClr val="black"/>
                 </a:solidFill>
               </a:rPr>
-              <a:t>6/29/2018 7:17 PM</a:t>
+              <a:t>7/2/2018 8:45 PM</a:t>
             </a:fld>
             <a:endParaRPr lang="en-US" dirty="0">
               <a:solidFill>
@@ -20895,10 +20895,10 @@
       </p:sp>
       <p:pic>
         <p:nvPicPr>
-          <p:cNvPr id="4" name="Picture 3" descr="Preferred New microservices architecture solution&#10;&#10;Diagram of a high-level architecture of the core services that compose the new microservices architecture, as well as the state they hold. The diagram is made up of external services, microservices and state, and externalized state. External services is payment processing, external state is Orders/Events/CustomerAccounts, and Microservices and state is: Event Catalog, Customer Accounts, and Ticket Orders services, Queue, Ticket Actor Service, Ticket, Email Service, and Payment Service.&#10;&#10;In the diagram, Two arrows labeled &quot;Read from Externalized state&quot; point from Externalized state to Customer Accounts Services and Event Catalog Service. The remaining microservices and state have an arrow labeled &quot;Externalize state for aggregation&quot; pointing back to Externalized state.">
+          <p:cNvPr id="3" name="Picture 2">
             <a:extLst>
               <a:ext uri="{FF2B5EF4-FFF2-40B4-BE49-F238E27FC236}">
-                <a16:creationId xmlns:a16="http://schemas.microsoft.com/office/drawing/2014/main" id="{73F9A010-51FF-4429-8626-073DB669009B}"/>
+                <a16:creationId xmlns:a16="http://schemas.microsoft.com/office/drawing/2014/main" id="{EBDB3C84-359B-4ABA-A59C-790FAC2D88F9}"/>
               </a:ext>
             </a:extLst>
           </p:cNvPr>
@@ -20908,30 +20908,19 @@
           <p:nvPr/>
         </p:nvPicPr>
         <p:blipFill>
-          <a:blip r:embed="rId3">
-            <a:extLst>
-              <a:ext uri="{28A0092B-C50C-407E-A947-70E740481C1C}">
-                <a14:useLocalDpi xmlns:a14="http://schemas.microsoft.com/office/drawing/2010/main" val="0"/>
-              </a:ext>
-            </a:extLst>
-          </a:blip>
-          <a:srcRect/>
+          <a:blip r:embed="rId3"/>
           <a:stretch>
             <a:fillRect/>
           </a:stretch>
         </p:blipFill>
-        <p:spPr bwMode="auto">
+        <p:spPr>
           <a:xfrm>
-            <a:off x="1317072" y="1006096"/>
-            <a:ext cx="9557855" cy="5652612"/>
+            <a:off x="1804737" y="1189176"/>
+            <a:ext cx="8938804" cy="5607923"/>
           </a:xfrm>
           <a:prstGeom prst="rect">
             <a:avLst/>
           </a:prstGeom>
-          <a:noFill/>
-          <a:ln>
-            <a:noFill/>
-          </a:ln>
         </p:spPr>
       </p:pic>
     </p:spTree>

</xml_diff>